<commit_message>
extended(Lightning Talk): Code added
</commit_message>
<xml_diff>
--- a/week-03/lightning-talk/Lightning Talk (Collections) Arnold BARNA 2017-09-22.pptx
+++ b/week-03/lightning-talk/Lightning Talk (Collections) Arnold BARNA 2017-09-22.pptx
@@ -4546,7 +4546,7 @@
               <a:rPr lang="en-US" b="1" dirty="0">
                 <a:hlinkClick r:id="rId2"/>
               </a:rPr>
-              <a:t>SortablePokerHands</a:t>
+              <a:t>lightning-talk</a:t>
             </a:r>
             <a:endParaRPr lang="en-US" b="1" dirty="0"/>
           </a:p>
@@ -4563,25 +4563,25 @@
             <a:pPr lvl="1"/>
             <a:r>
               <a:rPr lang="en-US" dirty="0">
-                <a:hlinkClick r:id="rId3"/>
+                <a:hlinkClick r:id="rId2"/>
               </a:rPr>
               <a:t>https://github.com/greenfox-academy/</a:t>
             </a:r>
             <a:r>
               <a:rPr lang="en-US" b="1" dirty="0">
-                <a:hlinkClick r:id="rId3"/>
+                <a:hlinkClick r:id="rId2"/>
               </a:rPr>
               <a:t>bramble100</a:t>
             </a:r>
             <a:r>
               <a:rPr lang="en-US" dirty="0">
-                <a:hlinkClick r:id="rId3"/>
+                <a:hlinkClick r:id="rId2"/>
               </a:rPr>
               <a:t>/tree/master/week-03/</a:t>
             </a:r>
             <a:r>
               <a:rPr lang="en-US" b="1" dirty="0">
-                <a:hlinkClick r:id="rId3"/>
+                <a:hlinkClick r:id="rId2"/>
               </a:rPr>
               <a:t>lightning-talk</a:t>
             </a:r>

</xml_diff>